<commit_message>
Add Custom Matlab A Star Script
</commit_message>
<xml_diff>
--- a/Presentation_Sources.pptx
+++ b/Presentation_Sources.pptx
@@ -9,8 +9,8 @@
   </p:notesMasterIdLst>
   <p:sldIdLst>
     <p:sldId id="298" r:id="rId2"/>
-    <p:sldId id="463" r:id="rId3"/>
-    <p:sldId id="488" r:id="rId4"/>
+    <p:sldId id="488" r:id="rId3"/>
+    <p:sldId id="489" r:id="rId4"/>
   </p:sldIdLst>
   <p:sldSz cx="21855113" cy="12293600"/>
   <p:notesSz cx="6858000" cy="9144000"/>
@@ -5347,7 +5347,7 @@
           <a:p>
             <a:fld id="{7808C551-22FF-4CB8-B8F2-5188D8B377D2}" type="datetimeFigureOut">
               <a:rPr lang="tr-TR" smtClean="0"/>
-              <a:t>6.03.2024</a:t>
+              <a:t>8.03.2024</a:t>
             </a:fld>
             <a:endParaRPr lang="tr-TR"/>
           </a:p>
@@ -5753,7 +5753,7 @@
                 <a:latin typeface="Calibri"/>
               </a:rPr>
               <a:pPr/>
-              <a:t>6.03.2024</a:t>
+              <a:t>8.03.2024</a:t>
             </a:fld>
             <a:endParaRPr lang="tr-TR">
               <a:solidFill>
@@ -5960,7 +5960,7 @@
                 <a:latin typeface="Calibri"/>
               </a:rPr>
               <a:pPr/>
-              <a:t>6.03.2024</a:t>
+              <a:t>8.03.2024</a:t>
             </a:fld>
             <a:endParaRPr lang="tr-TR">
               <a:solidFill>
@@ -6177,7 +6177,7 @@
                 <a:latin typeface="Calibri"/>
               </a:rPr>
               <a:pPr/>
-              <a:t>6.03.2024</a:t>
+              <a:t>8.03.2024</a:t>
             </a:fld>
             <a:endParaRPr lang="tr-TR">
               <a:solidFill>
@@ -6384,7 +6384,7 @@
                 <a:latin typeface="Calibri"/>
               </a:rPr>
               <a:pPr/>
-              <a:t>6.03.2024</a:t>
+              <a:t>8.03.2024</a:t>
             </a:fld>
             <a:endParaRPr lang="tr-TR">
               <a:solidFill>
@@ -6667,7 +6667,7 @@
                 <a:latin typeface="Calibri"/>
               </a:rPr>
               <a:pPr/>
-              <a:t>6.03.2024</a:t>
+              <a:t>8.03.2024</a:t>
             </a:fld>
             <a:endParaRPr lang="tr-TR">
               <a:solidFill>
@@ -6936,7 +6936,7 @@
                 <a:latin typeface="Calibri"/>
               </a:rPr>
               <a:pPr/>
-              <a:t>6.03.2024</a:t>
+              <a:t>8.03.2024</a:t>
             </a:fld>
             <a:endParaRPr lang="tr-TR">
               <a:solidFill>
@@ -7340,7 +7340,7 @@
                 <a:latin typeface="Calibri"/>
               </a:rPr>
               <a:pPr/>
-              <a:t>6.03.2024</a:t>
+              <a:t>8.03.2024</a:t>
             </a:fld>
             <a:endParaRPr lang="tr-TR">
               <a:solidFill>
@@ -7495,7 +7495,7 @@
                 <a:latin typeface="Calibri"/>
               </a:rPr>
               <a:pPr/>
-              <a:t>6.03.2024</a:t>
+              <a:t>8.03.2024</a:t>
             </a:fld>
             <a:endParaRPr lang="tr-TR">
               <a:solidFill>
@@ -7627,7 +7627,7 @@
                 <a:latin typeface="Calibri"/>
               </a:rPr>
               <a:pPr/>
-              <a:t>6.03.2024</a:t>
+              <a:t>8.03.2024</a:t>
             </a:fld>
             <a:endParaRPr lang="tr-TR">
               <a:solidFill>
@@ -7941,7 +7941,7 @@
                 <a:latin typeface="Calibri"/>
               </a:rPr>
               <a:pPr/>
-              <a:t>6.03.2024</a:t>
+              <a:t>8.03.2024</a:t>
             </a:fld>
             <a:endParaRPr lang="tr-TR">
               <a:solidFill>
@@ -8235,7 +8235,7 @@
                 <a:latin typeface="Calibri"/>
               </a:rPr>
               <a:pPr/>
-              <a:t>6.03.2024</a:t>
+              <a:t>8.03.2024</a:t>
             </a:fld>
             <a:endParaRPr lang="tr-TR">
               <a:solidFill>
@@ -8486,7 +8486,7 @@
           <a:p>
             <a:fld id="{E1F0B1EE-5644-334F-BFED-7CDB7C3E0DCD}" type="datetimeFigureOut">
               <a:rPr lang="tr-TR" smtClean="0"/>
-              <a:t>6.03.2024</a:t>
+              <a:t>8.03.2024</a:t>
             </a:fld>
             <a:endParaRPr lang="tr-TR"/>
           </a:p>
@@ -8957,17 +8957,6 @@
               </a:lnSpc>
             </a:pPr>
             <a:r>
-              <a:rPr lang="en-US" sz="4800" dirty="0">
-                <a:solidFill>
-                  <a:prstClr val="white"/>
-                </a:solidFill>
-                <a:latin typeface="Calibri" charset="0"/>
-                <a:ea typeface="Calibri" charset="0"/>
-                <a:cs typeface="Calibri" charset="0"/>
-              </a:rPr>
-              <a:t>ITU ARC</a:t>
-            </a:r>
-            <a:r>
               <a:rPr lang="tr-TR" sz="4800" dirty="0">
                 <a:solidFill>
                   <a:prstClr val="white"/>
@@ -8976,7 +8965,7 @@
                 <a:ea typeface="Calibri" charset="0"/>
                 <a:cs typeface="Calibri" charset="0"/>
               </a:rPr>
-              <a:t> için Günlük Notlarım</a:t>
+              <a:t>Yüksek Lisans Bitirme Tezi için Notlarım</a:t>
             </a:r>
           </a:p>
         </p:txBody>
@@ -9097,346 +9086,6 @@
 </file>
 
 <file path=ppt/slides/slide2.xml><?xml version="1.0" encoding="utf-8"?>
-<p:sld xmlns:a="http://schemas.openxmlformats.org/drawingml/2006/main" xmlns:r="http://schemas.openxmlformats.org/officeDocument/2006/relationships" xmlns:p="http://schemas.openxmlformats.org/presentationml/2006/main">
-  <p:cSld>
-    <p:bg>
-      <p:bgPr>
-        <a:blipFill dpi="0" rotWithShape="1">
-          <a:blip r:embed="rId2">
-            <a:lum/>
-          </a:blip>
-          <a:srcRect/>
-          <a:stretch>
-            <a:fillRect t="-17000" b="-17000"/>
-          </a:stretch>
-        </a:blipFill>
-        <a:effectLst/>
-      </p:bgPr>
-    </p:bg>
-    <p:spTree>
-      <p:nvGrpSpPr>
-        <p:cNvPr id="1" name=""/>
-        <p:cNvGrpSpPr/>
-        <p:nvPr/>
-      </p:nvGrpSpPr>
-      <p:grpSpPr>
-        <a:xfrm>
-          <a:off x="0" y="0"/>
-          <a:ext cx="0" cy="0"/>
-          <a:chOff x="0" y="0"/>
-          <a:chExt cx="0" cy="0"/>
-        </a:xfrm>
-      </p:grpSpPr>
-      <p:sp>
-        <p:nvSpPr>
-          <p:cNvPr id="2" name="Başlık 3"/>
-          <p:cNvSpPr txBox="1">
-            <a:spLocks/>
-          </p:cNvSpPr>
-          <p:nvPr/>
-        </p:nvSpPr>
-        <p:spPr>
-          <a:xfrm>
-            <a:off x="2798762" y="8514754"/>
-            <a:ext cx="16257588" cy="1528251"/>
-          </a:xfrm>
-          <a:prstGeom prst="rect">
-            <a:avLst/>
-          </a:prstGeom>
-        </p:spPr>
-        <p:txBody>
-          <a:bodyPr vert="horz" lIns="91440" tIns="45720" rIns="91440" bIns="45720" rtlCol="0" anchor="ctr">
-            <a:noAutofit/>
-          </a:bodyPr>
-          <a:lstStyle>
-            <a:lvl1pPr algn="ctr" defTabSz="1219352" rtl="0" eaLnBrk="1" latinLnBrk="0" hangingPunct="1">
-              <a:lnSpc>
-                <a:spcPct val="90000"/>
-              </a:lnSpc>
-              <a:spcBef>
-                <a:spcPct val="0"/>
-              </a:spcBef>
-              <a:buNone/>
-              <a:defRPr sz="8001" kern="1200">
-                <a:solidFill>
-                  <a:schemeClr val="tx1"/>
-                </a:solidFill>
-                <a:latin typeface="+mj-lt"/>
-                <a:ea typeface="+mj-ea"/>
-                <a:cs typeface="+mj-cs"/>
-              </a:defRPr>
-            </a:lvl1pPr>
-          </a:lstStyle>
-          <a:p>
-            <a:pPr marL="0" marR="0" lvl="0" indent="0" algn="ctr" defTabSz="1219352" rtl="0" eaLnBrk="1" fontAlgn="auto" latinLnBrk="0" hangingPunct="1">
-              <a:lnSpc>
-                <a:spcPct val="100000"/>
-              </a:lnSpc>
-              <a:spcBef>
-                <a:spcPct val="0"/>
-              </a:spcBef>
-              <a:spcAft>
-                <a:spcPts val="0"/>
-              </a:spcAft>
-              <a:buClrTx/>
-              <a:buSzTx/>
-              <a:buFontTx/>
-              <a:buNone/>
-              <a:tabLst/>
-              <a:defRPr/>
-            </a:pPr>
-            <a:r>
-              <a:rPr lang="en-US" sz="4800" dirty="0">
-                <a:solidFill>
-                  <a:prstClr val="white"/>
-                </a:solidFill>
-                <a:latin typeface="Calibri" charset="0"/>
-                <a:ea typeface="Calibri" charset="0"/>
-                <a:cs typeface="Calibri" charset="0"/>
-              </a:rPr>
-              <a:t>01</a:t>
-            </a:r>
-            <a:r>
-              <a:rPr lang="tr-TR" sz="4800" dirty="0">
-                <a:solidFill>
-                  <a:prstClr val="white"/>
-                </a:solidFill>
-                <a:latin typeface="Calibri" charset="0"/>
-                <a:ea typeface="Calibri" charset="0"/>
-                <a:cs typeface="Calibri" charset="0"/>
-              </a:rPr>
-              <a:t>/</a:t>
-            </a:r>
-            <a:r>
-              <a:rPr lang="en-US" sz="4800" dirty="0">
-                <a:solidFill>
-                  <a:prstClr val="white"/>
-                </a:solidFill>
-                <a:latin typeface="Calibri" charset="0"/>
-                <a:ea typeface="Calibri" charset="0"/>
-                <a:cs typeface="Calibri" charset="0"/>
-              </a:rPr>
-              <a:t>01</a:t>
-            </a:r>
-            <a:r>
-              <a:rPr kumimoji="0" lang="tr-TR" sz="4800" b="0" i="0" u="none" strike="noStrike" kern="1200" cap="none" spc="0" normalizeH="0" baseline="0" noProof="0" dirty="0">
-                <a:ln>
-                  <a:noFill/>
-                </a:ln>
-                <a:solidFill>
-                  <a:prstClr val="white"/>
-                </a:solidFill>
-                <a:effectLst/>
-                <a:uLnTx/>
-                <a:uFillTx/>
-                <a:latin typeface="Calibri" charset="0"/>
-                <a:ea typeface="Calibri" charset="0"/>
-                <a:cs typeface="Calibri" charset="0"/>
-              </a:rPr>
-              <a:t>/202</a:t>
-            </a:r>
-            <a:r>
-              <a:rPr kumimoji="0" lang="en-US" sz="4800" b="0" i="0" u="none" strike="noStrike" kern="1200" cap="none" spc="0" normalizeH="0" baseline="0" noProof="0" dirty="0">
-                <a:ln>
-                  <a:noFill/>
-                </a:ln>
-                <a:solidFill>
-                  <a:prstClr val="white"/>
-                </a:solidFill>
-                <a:effectLst/>
-                <a:uLnTx/>
-                <a:uFillTx/>
-                <a:latin typeface="Calibri" charset="0"/>
-                <a:ea typeface="Calibri" charset="0"/>
-                <a:cs typeface="Calibri" charset="0"/>
-              </a:rPr>
-              <a:t>4</a:t>
-            </a:r>
-            <a:endParaRPr kumimoji="0" lang="tr-TR" sz="4800" b="0" i="0" u="none" strike="noStrike" kern="1200" cap="none" spc="0" normalizeH="0" baseline="0" noProof="0" dirty="0">
-              <a:ln>
-                <a:noFill/>
-              </a:ln>
-              <a:solidFill>
-                <a:prstClr val="white"/>
-              </a:solidFill>
-              <a:effectLst/>
-              <a:uLnTx/>
-              <a:uFillTx/>
-              <a:latin typeface="Calibri" charset="0"/>
-              <a:ea typeface="Calibri" charset="0"/>
-              <a:cs typeface="Calibri" charset="0"/>
-            </a:endParaRPr>
-          </a:p>
-        </p:txBody>
-      </p:sp>
-      <p:sp>
-        <p:nvSpPr>
-          <p:cNvPr id="3" name="Başlık 3"/>
-          <p:cNvSpPr txBox="1">
-            <a:spLocks/>
-          </p:cNvSpPr>
-          <p:nvPr/>
-        </p:nvSpPr>
-        <p:spPr>
-          <a:xfrm>
-            <a:off x="2798762" y="10169584"/>
-            <a:ext cx="16257588" cy="1781412"/>
-          </a:xfrm>
-          <a:prstGeom prst="rect">
-            <a:avLst/>
-          </a:prstGeom>
-        </p:spPr>
-        <p:txBody>
-          <a:bodyPr vert="horz" lIns="91440" tIns="45720" rIns="91440" bIns="45720" rtlCol="0" anchor="b">
-            <a:noAutofit/>
-          </a:bodyPr>
-          <a:lstStyle>
-            <a:lvl1pPr algn="ctr" defTabSz="1219352" rtl="0" eaLnBrk="1" latinLnBrk="0" hangingPunct="1">
-              <a:lnSpc>
-                <a:spcPct val="90000"/>
-              </a:lnSpc>
-              <a:spcBef>
-                <a:spcPct val="0"/>
-              </a:spcBef>
-              <a:buNone/>
-              <a:defRPr sz="8001" kern="1200">
-                <a:solidFill>
-                  <a:schemeClr val="tx1"/>
-                </a:solidFill>
-                <a:latin typeface="+mj-lt"/>
-                <a:ea typeface="+mj-ea"/>
-                <a:cs typeface="+mj-cs"/>
-              </a:defRPr>
-            </a:lvl1pPr>
-          </a:lstStyle>
-          <a:p>
-            <a:pPr marL="0" marR="0" lvl="0" indent="0" algn="ctr" defTabSz="1219352" rtl="0" eaLnBrk="1" fontAlgn="auto" latinLnBrk="0" hangingPunct="1">
-              <a:lnSpc>
-                <a:spcPct val="100000"/>
-              </a:lnSpc>
-              <a:spcBef>
-                <a:spcPct val="0"/>
-              </a:spcBef>
-              <a:spcAft>
-                <a:spcPts val="0"/>
-              </a:spcAft>
-              <a:buClrTx/>
-              <a:buSzTx/>
-              <a:buFontTx/>
-              <a:buNone/>
-              <a:tabLst/>
-              <a:defRPr/>
-            </a:pPr>
-            <a:endParaRPr kumimoji="0" lang="tr-TR" sz="3200" b="1" i="0" u="none" strike="noStrike" kern="1200" cap="none" spc="0" normalizeH="0" baseline="0" noProof="0" dirty="0">
-              <a:ln>
-                <a:noFill/>
-              </a:ln>
-              <a:solidFill>
-                <a:prstClr val="white"/>
-              </a:solidFill>
-              <a:effectLst/>
-              <a:uLnTx/>
-              <a:uFillTx/>
-              <a:latin typeface="Calibri" charset="0"/>
-              <a:ea typeface="Calibri" charset="0"/>
-              <a:cs typeface="Calibri" charset="0"/>
-            </a:endParaRPr>
-          </a:p>
-        </p:txBody>
-      </p:sp>
-      <p:sp>
-        <p:nvSpPr>
-          <p:cNvPr id="4" name="TextBox 3">
-            <a:extLst>
-              <a:ext uri="{FF2B5EF4-FFF2-40B4-BE49-F238E27FC236}">
-                <a16:creationId xmlns:a16="http://schemas.microsoft.com/office/drawing/2014/main" id="{F2F85F2D-EBB3-4B24-A2B4-D54337DCE7AC}"/>
-              </a:ext>
-            </a:extLst>
-          </p:cNvPr>
-          <p:cNvSpPr txBox="1"/>
-          <p:nvPr/>
-        </p:nvSpPr>
-        <p:spPr>
-          <a:xfrm>
-            <a:off x="4096853" y="10413961"/>
-            <a:ext cx="13661409" cy="646331"/>
-          </a:xfrm>
-          <a:prstGeom prst="rect">
-            <a:avLst/>
-          </a:prstGeom>
-          <a:noFill/>
-        </p:spPr>
-        <p:txBody>
-          <a:bodyPr wrap="square" rtlCol="0">
-            <a:spAutoFit/>
-          </a:bodyPr>
-          <a:lstStyle/>
-          <a:p>
-            <a:pPr marL="0" marR="0" lvl="0" indent="0" algn="ctr" defTabSz="1370411" rtl="0" eaLnBrk="1" fontAlgn="auto" latinLnBrk="0" hangingPunct="1">
-              <a:lnSpc>
-                <a:spcPct val="100000"/>
-              </a:lnSpc>
-              <a:spcBef>
-                <a:spcPts val="0"/>
-              </a:spcBef>
-              <a:spcAft>
-                <a:spcPts val="0"/>
-              </a:spcAft>
-              <a:buClrTx/>
-              <a:buSzTx/>
-              <a:buFontTx/>
-              <a:buNone/>
-              <a:tabLst/>
-              <a:defRPr/>
-            </a:pPr>
-            <a:r>
-              <a:rPr kumimoji="0" lang="tr-TR" sz="3600" b="0" i="0" u="none" strike="noStrike" kern="1200" cap="none" spc="0" normalizeH="0" baseline="0" noProof="0" dirty="0">
-                <a:ln>
-                  <a:noFill/>
-                </a:ln>
-                <a:solidFill>
-                  <a:prstClr val="white"/>
-                </a:solidFill>
-                <a:effectLst/>
-                <a:uLnTx/>
-                <a:uFillTx/>
-                <a:latin typeface="Calibri" panose="020F0502020204030204"/>
-                <a:ea typeface="+mn-ea"/>
-                <a:cs typeface="+mn-cs"/>
-              </a:rPr>
-              <a:t>Fatih Erol</a:t>
-            </a:r>
-            <a:endParaRPr kumimoji="0" lang="en-US" sz="3600" b="0" i="0" u="none" strike="noStrike" kern="1200" cap="none" spc="0" normalizeH="0" baseline="0" noProof="0" dirty="0">
-              <a:ln>
-                <a:noFill/>
-              </a:ln>
-              <a:solidFill>
-                <a:prstClr val="white"/>
-              </a:solidFill>
-              <a:effectLst/>
-              <a:uLnTx/>
-              <a:uFillTx/>
-              <a:latin typeface="Calibri" panose="020F0502020204030204"/>
-              <a:ea typeface="+mn-ea"/>
-              <a:cs typeface="+mn-cs"/>
-            </a:endParaRPr>
-          </a:p>
-        </p:txBody>
-      </p:sp>
-    </p:spTree>
-    <p:extLst>
-      <p:ext uri="{BB962C8B-B14F-4D97-AF65-F5344CB8AC3E}">
-        <p14:creationId xmlns:p14="http://schemas.microsoft.com/office/powerpoint/2010/main" val="540006143"/>
-      </p:ext>
-    </p:extLst>
-  </p:cSld>
-  <p:clrMapOvr>
-    <a:masterClrMapping/>
-  </p:clrMapOvr>
-</p:sld>
-</file>
-
-<file path=ppt/slides/slide3.xml><?xml version="1.0" encoding="utf-8"?>
 <p:sld xmlns:a="http://schemas.openxmlformats.org/drawingml/2006/main" xmlns:r="http://schemas.openxmlformats.org/officeDocument/2006/relationships" xmlns:p="http://schemas.openxmlformats.org/presentationml/2006/main">
   <p:cSld>
     <p:spTree>
@@ -9857,6 +9506,488 @@
   <p:clrMapOvr>
     <a:masterClrMapping/>
   </p:clrMapOvr>
+</p:sld>
+</file>
+
+<file path=ppt/slides/slide3.xml><?xml version="1.0" encoding="utf-8"?>
+<p:sld xmlns:a="http://schemas.openxmlformats.org/drawingml/2006/main" xmlns:r="http://schemas.openxmlformats.org/officeDocument/2006/relationships" xmlns:p="http://schemas.openxmlformats.org/presentationml/2006/main">
+  <p:cSld>
+    <p:spTree>
+      <p:nvGrpSpPr>
+        <p:cNvPr id="1" name=""/>
+        <p:cNvGrpSpPr/>
+        <p:nvPr/>
+      </p:nvGrpSpPr>
+      <p:grpSpPr>
+        <a:xfrm>
+          <a:off x="0" y="0"/>
+          <a:ext cx="0" cy="0"/>
+          <a:chOff x="0" y="0"/>
+          <a:chExt cx="0" cy="0"/>
+        </a:xfrm>
+      </p:grpSpPr>
+      <p:sp>
+        <p:nvSpPr>
+          <p:cNvPr id="4" name="Başlık 3">
+            <a:extLst>
+              <a:ext uri="{FF2B5EF4-FFF2-40B4-BE49-F238E27FC236}">
+                <a16:creationId xmlns:a16="http://schemas.microsoft.com/office/drawing/2014/main" id="{CA5C1D0E-3111-4A01-8906-EAD87479261F}"/>
+              </a:ext>
+            </a:extLst>
+          </p:cNvPr>
+          <p:cNvSpPr txBox="1">
+            <a:spLocks/>
+          </p:cNvSpPr>
+          <p:nvPr/>
+        </p:nvSpPr>
+        <p:spPr>
+          <a:xfrm>
+            <a:off x="1502539" y="255181"/>
+            <a:ext cx="16171174" cy="1913862"/>
+          </a:xfrm>
+          <a:prstGeom prst="rect">
+            <a:avLst/>
+          </a:prstGeom>
+        </p:spPr>
+        <p:txBody>
+          <a:bodyPr vert="horz" lIns="91440" tIns="45720" rIns="91440" bIns="45720" rtlCol="0" anchor="ctr">
+            <a:normAutofit/>
+          </a:bodyPr>
+          <a:lstStyle>
+            <a:lvl1pPr algn="l" defTabSz="1639153" rtl="0" eaLnBrk="1" latinLnBrk="0" hangingPunct="1">
+              <a:lnSpc>
+                <a:spcPct val="90000"/>
+              </a:lnSpc>
+              <a:spcBef>
+                <a:spcPct val="0"/>
+              </a:spcBef>
+              <a:buNone/>
+              <a:defRPr sz="7887" kern="1200">
+                <a:solidFill>
+                  <a:schemeClr val="tx1"/>
+                </a:solidFill>
+                <a:latin typeface="+mj-lt"/>
+                <a:ea typeface="+mj-ea"/>
+                <a:cs typeface="+mj-cs"/>
+              </a:defRPr>
+            </a:lvl1pPr>
+          </a:lstStyle>
+          <a:p>
+            <a:pPr marL="0" marR="0" lvl="0" indent="0" algn="l" defTabSz="1639153" rtl="0" eaLnBrk="1" fontAlgn="auto" latinLnBrk="0" hangingPunct="1">
+              <a:lnSpc>
+                <a:spcPct val="90000"/>
+              </a:lnSpc>
+              <a:spcBef>
+                <a:spcPct val="0"/>
+              </a:spcBef>
+              <a:spcAft>
+                <a:spcPts val="0"/>
+              </a:spcAft>
+              <a:buClrTx/>
+              <a:buSzTx/>
+              <a:buFontTx/>
+              <a:buNone/>
+              <a:tabLst/>
+              <a:defRPr/>
+            </a:pPr>
+            <a:endParaRPr kumimoji="0" lang="tr-TR" sz="5400" b="1" i="0" u="none" strike="noStrike" kern="1200" cap="none" spc="0" normalizeH="0" baseline="0" noProof="0" dirty="0">
+              <a:ln>
+                <a:noFill/>
+              </a:ln>
+              <a:solidFill>
+                <a:prstClr val="white"/>
+              </a:solidFill>
+              <a:effectLst/>
+              <a:uLnTx/>
+              <a:uFillTx/>
+              <a:latin typeface="Times New Roman" panose="02020603050405020304" pitchFamily="18" charset="0"/>
+              <a:ea typeface="Calibri" charset="0"/>
+              <a:cs typeface="Times New Roman" panose="02020603050405020304" pitchFamily="18" charset="0"/>
+            </a:endParaRPr>
+          </a:p>
+        </p:txBody>
+      </p:sp>
+      <p:sp>
+        <p:nvSpPr>
+          <p:cNvPr id="5" name="Başlık 3">
+            <a:extLst>
+              <a:ext uri="{FF2B5EF4-FFF2-40B4-BE49-F238E27FC236}">
+                <a16:creationId xmlns:a16="http://schemas.microsoft.com/office/drawing/2014/main" id="{5DC561D1-AD06-B891-5B28-3FA522F184B6}"/>
+              </a:ext>
+            </a:extLst>
+          </p:cNvPr>
+          <p:cNvSpPr txBox="1">
+            <a:spLocks/>
+          </p:cNvSpPr>
+          <p:nvPr/>
+        </p:nvSpPr>
+        <p:spPr>
+          <a:xfrm>
+            <a:off x="1654939" y="407581"/>
+            <a:ext cx="16171174" cy="1913862"/>
+          </a:xfrm>
+          <a:prstGeom prst="rect">
+            <a:avLst/>
+          </a:prstGeom>
+        </p:spPr>
+        <p:txBody>
+          <a:bodyPr vert="horz" lIns="91440" tIns="45720" rIns="91440" bIns="45720" rtlCol="0" anchor="ctr">
+            <a:normAutofit/>
+          </a:bodyPr>
+          <a:lstStyle>
+            <a:lvl1pPr algn="l" defTabSz="1639153" rtl="0" eaLnBrk="1" latinLnBrk="0" hangingPunct="1">
+              <a:lnSpc>
+                <a:spcPct val="90000"/>
+              </a:lnSpc>
+              <a:spcBef>
+                <a:spcPct val="0"/>
+              </a:spcBef>
+              <a:buNone/>
+              <a:defRPr sz="7887" kern="1200">
+                <a:solidFill>
+                  <a:schemeClr val="tx1"/>
+                </a:solidFill>
+                <a:latin typeface="+mj-lt"/>
+                <a:ea typeface="+mj-ea"/>
+                <a:cs typeface="+mj-cs"/>
+              </a:defRPr>
+            </a:lvl1pPr>
+          </a:lstStyle>
+          <a:p>
+            <a:pPr marL="0" marR="0" lvl="0" indent="0" algn="l" defTabSz="1639153" rtl="0" eaLnBrk="1" fontAlgn="auto" latinLnBrk="0" hangingPunct="1">
+              <a:lnSpc>
+                <a:spcPct val="90000"/>
+              </a:lnSpc>
+              <a:spcBef>
+                <a:spcPct val="0"/>
+              </a:spcBef>
+              <a:spcAft>
+                <a:spcPts val="0"/>
+              </a:spcAft>
+              <a:buClrTx/>
+              <a:buSzTx/>
+              <a:buFontTx/>
+              <a:buNone/>
+              <a:tabLst/>
+              <a:defRPr/>
+            </a:pPr>
+            <a:r>
+              <a:rPr lang="tr-TR" sz="5400" b="1" dirty="0">
+                <a:solidFill>
+                  <a:prstClr val="white"/>
+                </a:solidFill>
+                <a:latin typeface="Times New Roman" panose="02020603050405020304" pitchFamily="18" charset="0"/>
+                <a:ea typeface="Calibri" charset="0"/>
+                <a:cs typeface="Times New Roman" panose="02020603050405020304" pitchFamily="18" charset="0"/>
+              </a:rPr>
+              <a:t>A* Kodu Yazıldı</a:t>
+            </a:r>
+            <a:endParaRPr kumimoji="0" lang="tr-TR" sz="5400" b="1" i="0" u="none" strike="noStrike" kern="1200" cap="none" spc="0" normalizeH="0" baseline="0" noProof="0" dirty="0">
+              <a:ln>
+                <a:noFill/>
+              </a:ln>
+              <a:solidFill>
+                <a:prstClr val="white"/>
+              </a:solidFill>
+              <a:effectLst/>
+              <a:uLnTx/>
+              <a:uFillTx/>
+              <a:latin typeface="Times New Roman" panose="02020603050405020304" pitchFamily="18" charset="0"/>
+              <a:ea typeface="Calibri" charset="0"/>
+              <a:cs typeface="Times New Roman" panose="02020603050405020304" pitchFamily="18" charset="0"/>
+            </a:endParaRPr>
+          </a:p>
+        </p:txBody>
+      </p:sp>
+      <p:sp>
+        <p:nvSpPr>
+          <p:cNvPr id="9" name="TextBox 8">
+            <a:extLst>
+              <a:ext uri="{FF2B5EF4-FFF2-40B4-BE49-F238E27FC236}">
+                <a16:creationId xmlns:a16="http://schemas.microsoft.com/office/drawing/2014/main" id="{7B6E76A6-20ED-45A9-85DD-403D303464E2}"/>
+              </a:ext>
+            </a:extLst>
+          </p:cNvPr>
+          <p:cNvSpPr txBox="1"/>
+          <p:nvPr/>
+        </p:nvSpPr>
+        <p:spPr>
+          <a:xfrm>
+            <a:off x="4217496" y="5539166"/>
+            <a:ext cx="4085367" cy="507511"/>
+          </a:xfrm>
+          <a:prstGeom prst="rect">
+            <a:avLst/>
+          </a:prstGeom>
+          <a:noFill/>
+        </p:spPr>
+        <p:txBody>
+          <a:bodyPr wrap="square" rtlCol="0">
+            <a:spAutoFit/>
+          </a:bodyPr>
+          <a:lstStyle/>
+          <a:p>
+            <a:r>
+              <a:rPr lang="tr-TR" b="1" u="sng" dirty="0"/>
+              <a:t>Dosyalar:</a:t>
+            </a:r>
+            <a:endParaRPr lang="en-US" b="1" i="1" u="sng" dirty="0"/>
+          </a:p>
+        </p:txBody>
+      </p:sp>
+      <p:pic>
+        <p:nvPicPr>
+          <p:cNvPr id="2" name="0309">
+            <a:hlinkClick r:id="" action="ppaction://media"/>
+            <a:extLst>
+              <a:ext uri="{FF2B5EF4-FFF2-40B4-BE49-F238E27FC236}">
+                <a16:creationId xmlns:a16="http://schemas.microsoft.com/office/drawing/2014/main" id="{6A471AE9-11E3-40DB-8A53-615540C536B8}"/>
+              </a:ext>
+            </a:extLst>
+          </p:cNvPr>
+          <p:cNvPicPr>
+            <a:picLocks noChangeAspect="1"/>
+          </p:cNvPicPr>
+          <p:nvPr>
+            <a:videoFile r:link="rId3"/>
+            <p:extLst>
+              <p:ext uri="{DAA4B4D4-6D71-4841-9C94-3DE7FCFB9230}">
+                <p14:media xmlns:p14="http://schemas.microsoft.com/office/powerpoint/2010/main" r:embed="rId2"/>
+              </p:ext>
+            </p:extLst>
+          </p:nvPr>
+        </p:nvPicPr>
+        <p:blipFill rotWithShape="1">
+          <a:blip r:embed="rId5"/>
+          <a:srcRect l="4249" t="6220" b="2415"/>
+          <a:stretch/>
+        </p:blipFill>
+        <p:spPr>
+          <a:xfrm>
+            <a:off x="9740526" y="2473843"/>
+            <a:ext cx="9204871" cy="8783339"/>
+          </a:xfrm>
+          <a:prstGeom prst="rect">
+            <a:avLst/>
+          </a:prstGeom>
+          <a:ln>
+            <a:solidFill>
+              <a:schemeClr val="tx1"/>
+            </a:solidFill>
+          </a:ln>
+        </p:spPr>
+      </p:pic>
+      <p:graphicFrame>
+        <p:nvGraphicFramePr>
+          <p:cNvPr id="6" name="Nesne 5">
+            <a:extLst>
+              <a:ext uri="{FF2B5EF4-FFF2-40B4-BE49-F238E27FC236}">
+                <a16:creationId xmlns:a16="http://schemas.microsoft.com/office/drawing/2014/main" id="{AEC1087A-0DB6-4473-B0CD-62B5FE611921}"/>
+              </a:ext>
+            </a:extLst>
+          </p:cNvPr>
+          <p:cNvGraphicFramePr>
+            <a:graphicFrameLocks noChangeAspect="1"/>
+          </p:cNvGraphicFramePr>
+          <p:nvPr>
+            <p:extLst>
+              <p:ext uri="{D42A27DB-BD31-4B8C-83A1-F6EECF244321}">
+                <p14:modId xmlns:p14="http://schemas.microsoft.com/office/powerpoint/2010/main" val="2597733062"/>
+              </p:ext>
+            </p:extLst>
+          </p:nvPr>
+        </p:nvGraphicFramePr>
+        <p:xfrm>
+          <a:off x="3541201" y="6146800"/>
+          <a:ext cx="2962413" cy="936108"/>
+        </p:xfrm>
+        <a:graphic>
+          <a:graphicData uri="http://schemas.openxmlformats.org/presentationml/2006/ole">
+            <mc:AlternateContent xmlns:mc="http://schemas.openxmlformats.org/markup-compatibility/2006">
+              <mc:Choice xmlns:v="urn:schemas-microsoft-com:vml" Requires="v">
+                <p:oleObj spid="_x0000_s1026" name="Paketleyici Kabuk Nesnesi" showAsIcon="1" r:id="rId6" imgW="1221480" imgH="385200" progId="Package">
+                  <p:embed/>
+                </p:oleObj>
+              </mc:Choice>
+              <mc:Fallback>
+                <p:oleObj name="Paketleyici Kabuk Nesnesi" showAsIcon="1" r:id="rId6" imgW="1221480" imgH="385200" progId="Package">
+                  <p:embed/>
+                  <p:pic>
+                    <p:nvPicPr>
+                      <p:cNvPr id="0" name=""/>
+                      <p:cNvPicPr/>
+                      <p:nvPr/>
+                    </p:nvPicPr>
+                    <p:blipFill>
+                      <a:blip r:embed="rId7"/>
+                      <a:stretch>
+                        <a:fillRect/>
+                      </a:stretch>
+                    </p:blipFill>
+                    <p:spPr>
+                      <a:xfrm>
+                        <a:off x="3541201" y="6146800"/>
+                        <a:ext cx="2962413" cy="936108"/>
+                      </a:xfrm>
+                      <a:prstGeom prst="rect">
+                        <a:avLst/>
+                      </a:prstGeom>
+                    </p:spPr>
+                  </p:pic>
+                </p:oleObj>
+              </mc:Fallback>
+            </mc:AlternateContent>
+          </a:graphicData>
+        </a:graphic>
+      </p:graphicFrame>
+    </p:spTree>
+    <p:extLst>
+      <p:ext uri="{BB962C8B-B14F-4D97-AF65-F5344CB8AC3E}">
+        <p14:creationId xmlns:p14="http://schemas.microsoft.com/office/powerpoint/2010/main" val="3627417143"/>
+      </p:ext>
+    </p:extLst>
+  </p:cSld>
+  <p:clrMapOvr>
+    <a:masterClrMapping/>
+  </p:clrMapOvr>
+  <p:timing>
+    <p:tnLst>
+      <p:par>
+        <p:cTn id="1" dur="indefinite" restart="never" nodeType="tmRoot">
+          <p:childTnLst>
+            <p:seq concurrent="1" nextAc="seek">
+              <p:cTn id="2" dur="indefinite" nodeType="mainSeq">
+                <p:childTnLst>
+                  <p:par>
+                    <p:cTn id="3" fill="hold">
+                      <p:stCondLst>
+                        <p:cond delay="indefinite"/>
+                        <p:cond evt="onBegin" delay="0">
+                          <p:tn val="2"/>
+                        </p:cond>
+                      </p:stCondLst>
+                      <p:childTnLst>
+                        <p:par>
+                          <p:cTn id="4" fill="hold">
+                            <p:stCondLst>
+                              <p:cond delay="0"/>
+                            </p:stCondLst>
+                            <p:childTnLst>
+                              <p:par>
+                                <p:cTn id="5" presetID="1" presetClass="mediacall" presetSubtype="0" fill="hold" nodeType="afterEffect">
+                                  <p:stCondLst>
+                                    <p:cond delay="0"/>
+                                  </p:stCondLst>
+                                  <p:childTnLst>
+                                    <p:cmd type="call" cmd="playFrom(0.0)">
+                                      <p:cBhvr>
+                                        <p:cTn id="6" dur="14002" fill="hold"/>
+                                        <p:tgtEl>
+                                          <p:spTgt spid="2"/>
+                                        </p:tgtEl>
+                                      </p:cBhvr>
+                                    </p:cmd>
+                                  </p:childTnLst>
+                                </p:cTn>
+                              </p:par>
+                            </p:childTnLst>
+                          </p:cTn>
+                        </p:par>
+                      </p:childTnLst>
+                    </p:cTn>
+                  </p:par>
+                </p:childTnLst>
+              </p:cTn>
+              <p:prevCondLst>
+                <p:cond evt="onPrev" delay="0">
+                  <p:tgtEl>
+                    <p:sldTgt/>
+                  </p:tgtEl>
+                </p:cond>
+              </p:prevCondLst>
+              <p:nextCondLst>
+                <p:cond evt="onNext" delay="0">
+                  <p:tgtEl>
+                    <p:sldTgt/>
+                  </p:tgtEl>
+                </p:cond>
+              </p:nextCondLst>
+            </p:seq>
+            <p:video>
+              <p:cMediaNode vol="80000">
+                <p:cTn id="7" repeatCount="indefinite" fill="remove" display="0">
+                  <p:stCondLst>
+                    <p:cond delay="indefinite"/>
+                  </p:stCondLst>
+                </p:cTn>
+                <p:tgtEl>
+                  <p:spTgt spid="2"/>
+                </p:tgtEl>
+              </p:cMediaNode>
+            </p:video>
+            <p:seq concurrent="1" nextAc="seek">
+              <p:cTn id="8" restart="whenNotActive" fill="hold" evtFilter="cancelBubble" nodeType="interactiveSeq">
+                <p:stCondLst>
+                  <p:cond evt="onClick" delay="0">
+                    <p:tgtEl>
+                      <p:spTgt spid="2"/>
+                    </p:tgtEl>
+                  </p:cond>
+                </p:stCondLst>
+                <p:endSync evt="end" delay="0">
+                  <p:rtn val="all"/>
+                </p:endSync>
+                <p:childTnLst>
+                  <p:par>
+                    <p:cTn id="9" fill="hold">
+                      <p:stCondLst>
+                        <p:cond delay="0"/>
+                      </p:stCondLst>
+                      <p:childTnLst>
+                        <p:par>
+                          <p:cTn id="10" fill="hold">
+                            <p:stCondLst>
+                              <p:cond delay="0"/>
+                            </p:stCondLst>
+                            <p:childTnLst>
+                              <p:par>
+                                <p:cTn id="11" presetID="2" presetClass="mediacall" presetSubtype="0" fill="hold" nodeType="clickEffect">
+                                  <p:stCondLst>
+                                    <p:cond delay="0"/>
+                                  </p:stCondLst>
+                                  <p:childTnLst>
+                                    <p:cmd type="call" cmd="togglePause">
+                                      <p:cBhvr>
+                                        <p:cTn id="12" dur="1" fill="hold"/>
+                                        <p:tgtEl>
+                                          <p:spTgt spid="2"/>
+                                        </p:tgtEl>
+                                      </p:cBhvr>
+                                    </p:cmd>
+                                  </p:childTnLst>
+                                </p:cTn>
+                              </p:par>
+                            </p:childTnLst>
+                          </p:cTn>
+                        </p:par>
+                      </p:childTnLst>
+                    </p:cTn>
+                  </p:par>
+                </p:childTnLst>
+              </p:cTn>
+              <p:nextCondLst>
+                <p:cond evt="onClick" delay="0">
+                  <p:tgtEl>
+                    <p:spTgt spid="2"/>
+                  </p:tgtEl>
+                </p:cond>
+              </p:nextCondLst>
+            </p:seq>
+          </p:childTnLst>
+        </p:cTn>
+      </p:par>
+    </p:tnLst>
+  </p:timing>
 </p:sld>
 </file>
 

</xml_diff>

<commit_message>
Start Hybrid A Star
</commit_message>
<xml_diff>
--- a/Presentation_Sources.pptx
+++ b/Presentation_Sources.pptx
@@ -5,12 +5,13 @@
     <p:sldMasterId id="2147484128" r:id="rId1"/>
   </p:sldMasterIdLst>
   <p:notesMasterIdLst>
-    <p:notesMasterId r:id="rId5"/>
+    <p:notesMasterId r:id="rId6"/>
   </p:notesMasterIdLst>
   <p:sldIdLst>
     <p:sldId id="298" r:id="rId2"/>
     <p:sldId id="488" r:id="rId3"/>
     <p:sldId id="489" r:id="rId4"/>
+    <p:sldId id="490" r:id="rId5"/>
   </p:sldIdLst>
   <p:sldSz cx="21855113" cy="12293600"/>
   <p:notesSz cx="6858000" cy="9144000"/>
@@ -5347,7 +5348,7 @@
           <a:p>
             <a:fld id="{7808C551-22FF-4CB8-B8F2-5188D8B377D2}" type="datetimeFigureOut">
               <a:rPr lang="tr-TR" smtClean="0"/>
-              <a:t>8.03.2024</a:t>
+              <a:t>11.03.2024</a:t>
             </a:fld>
             <a:endParaRPr lang="tr-TR"/>
           </a:p>
@@ -5753,7 +5754,7 @@
                 <a:latin typeface="Calibri"/>
               </a:rPr>
               <a:pPr/>
-              <a:t>8.03.2024</a:t>
+              <a:t>11.03.2024</a:t>
             </a:fld>
             <a:endParaRPr lang="tr-TR">
               <a:solidFill>
@@ -5960,7 +5961,7 @@
                 <a:latin typeface="Calibri"/>
               </a:rPr>
               <a:pPr/>
-              <a:t>8.03.2024</a:t>
+              <a:t>11.03.2024</a:t>
             </a:fld>
             <a:endParaRPr lang="tr-TR">
               <a:solidFill>
@@ -6177,7 +6178,7 @@
                 <a:latin typeface="Calibri"/>
               </a:rPr>
               <a:pPr/>
-              <a:t>8.03.2024</a:t>
+              <a:t>11.03.2024</a:t>
             </a:fld>
             <a:endParaRPr lang="tr-TR">
               <a:solidFill>
@@ -6384,7 +6385,7 @@
                 <a:latin typeface="Calibri"/>
               </a:rPr>
               <a:pPr/>
-              <a:t>8.03.2024</a:t>
+              <a:t>11.03.2024</a:t>
             </a:fld>
             <a:endParaRPr lang="tr-TR">
               <a:solidFill>
@@ -6667,7 +6668,7 @@
                 <a:latin typeface="Calibri"/>
               </a:rPr>
               <a:pPr/>
-              <a:t>8.03.2024</a:t>
+              <a:t>11.03.2024</a:t>
             </a:fld>
             <a:endParaRPr lang="tr-TR">
               <a:solidFill>
@@ -6936,7 +6937,7 @@
                 <a:latin typeface="Calibri"/>
               </a:rPr>
               <a:pPr/>
-              <a:t>8.03.2024</a:t>
+              <a:t>11.03.2024</a:t>
             </a:fld>
             <a:endParaRPr lang="tr-TR">
               <a:solidFill>
@@ -7340,7 +7341,7 @@
                 <a:latin typeface="Calibri"/>
               </a:rPr>
               <a:pPr/>
-              <a:t>8.03.2024</a:t>
+              <a:t>11.03.2024</a:t>
             </a:fld>
             <a:endParaRPr lang="tr-TR">
               <a:solidFill>
@@ -7495,7 +7496,7 @@
                 <a:latin typeface="Calibri"/>
               </a:rPr>
               <a:pPr/>
-              <a:t>8.03.2024</a:t>
+              <a:t>11.03.2024</a:t>
             </a:fld>
             <a:endParaRPr lang="tr-TR">
               <a:solidFill>
@@ -7627,7 +7628,7 @@
                 <a:latin typeface="Calibri"/>
               </a:rPr>
               <a:pPr/>
-              <a:t>8.03.2024</a:t>
+              <a:t>11.03.2024</a:t>
             </a:fld>
             <a:endParaRPr lang="tr-TR">
               <a:solidFill>
@@ -7941,7 +7942,7 @@
                 <a:latin typeface="Calibri"/>
               </a:rPr>
               <a:pPr/>
-              <a:t>8.03.2024</a:t>
+              <a:t>11.03.2024</a:t>
             </a:fld>
             <a:endParaRPr lang="tr-TR">
               <a:solidFill>
@@ -8235,7 +8236,7 @@
                 <a:latin typeface="Calibri"/>
               </a:rPr>
               <a:pPr/>
-              <a:t>8.03.2024</a:t>
+              <a:t>11.03.2024</a:t>
             </a:fld>
             <a:endParaRPr lang="tr-TR">
               <a:solidFill>
@@ -8486,7 +8487,7 @@
           <a:p>
             <a:fld id="{E1F0B1EE-5644-334F-BFED-7CDB7C3E0DCD}" type="datetimeFigureOut">
               <a:rPr lang="tr-TR" smtClean="0"/>
-              <a:t>8.03.2024</a:t>
+              <a:t>11.03.2024</a:t>
             </a:fld>
             <a:endParaRPr lang="tr-TR"/>
           </a:p>
@@ -9672,6 +9673,17 @@
               <a:defRPr/>
             </a:pPr>
             <a:r>
+              <a:rPr lang="tr-TR" sz="5400" b="1" dirty="0" err="1">
+                <a:solidFill>
+                  <a:prstClr val="white"/>
+                </a:solidFill>
+                <a:latin typeface="Times New Roman" panose="02020603050405020304" pitchFamily="18" charset="0"/>
+                <a:ea typeface="Calibri" charset="0"/>
+                <a:cs typeface="Times New Roman" panose="02020603050405020304" pitchFamily="18" charset="0"/>
+              </a:rPr>
+              <a:t>Custom</a:t>
+            </a:r>
+            <a:r>
               <a:rPr lang="tr-TR" sz="5400" b="1" dirty="0">
                 <a:solidFill>
                   <a:prstClr val="white"/>
@@ -9680,7 +9692,51 @@
                 <a:ea typeface="Calibri" charset="0"/>
                 <a:cs typeface="Times New Roman" panose="02020603050405020304" pitchFamily="18" charset="0"/>
               </a:rPr>
-              <a:t>A* Kodu Yazıldı</a:t>
+              <a:t> </a:t>
+            </a:r>
+            <a:r>
+              <a:rPr lang="tr-TR" sz="5400" b="1" dirty="0" err="1">
+                <a:solidFill>
+                  <a:prstClr val="white"/>
+                </a:solidFill>
+                <a:latin typeface="Times New Roman" panose="02020603050405020304" pitchFamily="18" charset="0"/>
+                <a:ea typeface="Calibri" charset="0"/>
+                <a:cs typeface="Times New Roman" panose="02020603050405020304" pitchFamily="18" charset="0"/>
+              </a:rPr>
+              <a:t>Matlab</a:t>
+            </a:r>
+            <a:r>
+              <a:rPr lang="tr-TR" sz="5400" b="1" dirty="0">
+                <a:solidFill>
+                  <a:prstClr val="white"/>
+                </a:solidFill>
+                <a:latin typeface="Times New Roman" panose="02020603050405020304" pitchFamily="18" charset="0"/>
+                <a:ea typeface="Calibri" charset="0"/>
+                <a:cs typeface="Times New Roman" panose="02020603050405020304" pitchFamily="18" charset="0"/>
+              </a:rPr>
+              <a:t> A* </a:t>
+            </a:r>
+            <a:r>
+              <a:rPr lang="tr-TR" sz="5400" b="1" dirty="0" err="1">
+                <a:solidFill>
+                  <a:prstClr val="white"/>
+                </a:solidFill>
+                <a:latin typeface="Times New Roman" panose="02020603050405020304" pitchFamily="18" charset="0"/>
+                <a:ea typeface="Calibri" charset="0"/>
+                <a:cs typeface="Times New Roman" panose="02020603050405020304" pitchFamily="18" charset="0"/>
+              </a:rPr>
+              <a:t>Code</a:t>
+            </a:r>
+            <a:r>
+              <a:rPr lang="tr-TR" sz="5400" b="1" dirty="0">
+                <a:solidFill>
+                  <a:prstClr val="white"/>
+                </a:solidFill>
+                <a:latin typeface="Times New Roman" panose="02020603050405020304" pitchFamily="18" charset="0"/>
+                <a:ea typeface="Calibri" charset="0"/>
+                <a:cs typeface="Times New Roman" panose="02020603050405020304" pitchFamily="18" charset="0"/>
+              </a:rPr>
+              <a:t> </a:t>
             </a:r>
             <a:endParaRPr kumimoji="0" lang="tr-TR" sz="5400" b="1" i="0" u="none" strike="noStrike" kern="1200" cap="none" spc="0" normalizeH="0" baseline="0" noProof="0" dirty="0">
               <a:ln>
@@ -9713,7 +9769,7 @@
         </p:nvSpPr>
         <p:spPr>
           <a:xfrm>
-            <a:off x="4217496" y="5539166"/>
+            <a:off x="4217496" y="6146800"/>
             <a:ext cx="4085367" cy="507511"/>
           </a:xfrm>
           <a:prstGeom prst="rect">
@@ -9792,20 +9848,20 @@
           <p:nvPr>
             <p:extLst>
               <p:ext uri="{D42A27DB-BD31-4B8C-83A1-F6EECF244321}">
-                <p14:modId xmlns:p14="http://schemas.microsoft.com/office/powerpoint/2010/main" val="2597733062"/>
+                <p14:modId xmlns:p14="http://schemas.microsoft.com/office/powerpoint/2010/main" val="2109711282"/>
               </p:ext>
             </p:extLst>
           </p:nvPr>
         </p:nvGraphicFramePr>
         <p:xfrm>
-          <a:off x="3541201" y="6146800"/>
+          <a:off x="3541201" y="6754434"/>
           <a:ext cx="2962413" cy="936108"/>
         </p:xfrm>
         <a:graphic>
           <a:graphicData uri="http://schemas.openxmlformats.org/presentationml/2006/ole">
             <mc:AlternateContent xmlns:mc="http://schemas.openxmlformats.org/markup-compatibility/2006">
               <mc:Choice xmlns:v="urn:schemas-microsoft-com:vml" Requires="v">
-                <p:oleObj spid="_x0000_s1026" name="Paketleyici Kabuk Nesnesi" showAsIcon="1" r:id="rId6" imgW="1221480" imgH="385200" progId="Package">
+                <p:oleObj spid="_x0000_s1029" name="Paketleyici Kabuk Nesnesi" showAsIcon="1" r:id="rId6" imgW="1221480" imgH="385200" progId="Package">
                   <p:embed/>
                 </p:oleObj>
               </mc:Choice>
@@ -9826,7 +9882,7 @@
                     </p:blipFill>
                     <p:spPr>
                       <a:xfrm>
-                        <a:off x="3541201" y="6146800"/>
+                        <a:off x="3541201" y="6754434"/>
                         <a:ext cx="2962413" cy="936108"/>
                       </a:xfrm>
                       <a:prstGeom prst="rect">
@@ -9840,6 +9896,50 @@
           </a:graphicData>
         </a:graphic>
       </p:graphicFrame>
+      <p:sp>
+        <p:nvSpPr>
+          <p:cNvPr id="7" name="TextBox 7">
+            <a:extLst>
+              <a:ext uri="{FF2B5EF4-FFF2-40B4-BE49-F238E27FC236}">
+                <a16:creationId xmlns:a16="http://schemas.microsoft.com/office/drawing/2014/main" id="{6BF87109-6B24-4194-8BA8-05073DA4ED0B}"/>
+              </a:ext>
+            </a:extLst>
+          </p:cNvPr>
+          <p:cNvSpPr txBox="1"/>
+          <p:nvPr/>
+        </p:nvSpPr>
+        <p:spPr>
+          <a:xfrm>
+            <a:off x="1502540" y="5486889"/>
+            <a:ext cx="7581500" cy="507511"/>
+          </a:xfrm>
+          <a:prstGeom prst="rect">
+            <a:avLst/>
+          </a:prstGeom>
+          <a:noFill/>
+        </p:spPr>
+        <p:txBody>
+          <a:bodyPr wrap="square" rtlCol="0">
+            <a:spAutoFit/>
+          </a:bodyPr>
+          <a:lstStyle/>
+          <a:p>
+            <a:pPr marL="457200" indent="-457200">
+              <a:buFont typeface="Arial" panose="020B0604020202020204" pitchFamily="34" charset="0"/>
+              <a:buChar char="•"/>
+            </a:pPr>
+            <a:r>
+              <a:rPr lang="tr-TR" dirty="0" err="1"/>
+              <a:t>Matlab</a:t>
+            </a:r>
+            <a:r>
+              <a:rPr lang="tr-TR" dirty="0"/>
+              <a:t> kullanılarak A* kodu yazılmıştır.</a:t>
+            </a:r>
+            <a:endParaRPr lang="en-US" i="1" dirty="0"/>
+          </a:p>
+        </p:txBody>
+      </p:sp>
     </p:spTree>
     <p:extLst>
       <p:ext uri="{BB962C8B-B14F-4D97-AF65-F5344CB8AC3E}">
@@ -9988,6 +10088,380 @@
       </p:par>
     </p:tnLst>
   </p:timing>
+</p:sld>
+</file>
+
+<file path=ppt/slides/slide4.xml><?xml version="1.0" encoding="utf-8"?>
+<p:sld xmlns:a="http://schemas.openxmlformats.org/drawingml/2006/main" xmlns:r="http://schemas.openxmlformats.org/officeDocument/2006/relationships" xmlns:p="http://schemas.openxmlformats.org/presentationml/2006/main">
+  <p:cSld>
+    <p:spTree>
+      <p:nvGrpSpPr>
+        <p:cNvPr id="1" name=""/>
+        <p:cNvGrpSpPr/>
+        <p:nvPr/>
+      </p:nvGrpSpPr>
+      <p:grpSpPr>
+        <a:xfrm>
+          <a:off x="0" y="0"/>
+          <a:ext cx="0" cy="0"/>
+          <a:chOff x="0" y="0"/>
+          <a:chExt cx="0" cy="0"/>
+        </a:xfrm>
+      </p:grpSpPr>
+      <p:sp>
+        <p:nvSpPr>
+          <p:cNvPr id="4" name="Başlık 3">
+            <a:extLst>
+              <a:ext uri="{FF2B5EF4-FFF2-40B4-BE49-F238E27FC236}">
+                <a16:creationId xmlns:a16="http://schemas.microsoft.com/office/drawing/2014/main" id="{CA5C1D0E-3111-4A01-8906-EAD87479261F}"/>
+              </a:ext>
+            </a:extLst>
+          </p:cNvPr>
+          <p:cNvSpPr txBox="1">
+            <a:spLocks/>
+          </p:cNvSpPr>
+          <p:nvPr/>
+        </p:nvSpPr>
+        <p:spPr>
+          <a:xfrm>
+            <a:off x="1502539" y="255181"/>
+            <a:ext cx="16171174" cy="1913862"/>
+          </a:xfrm>
+          <a:prstGeom prst="rect">
+            <a:avLst/>
+          </a:prstGeom>
+        </p:spPr>
+        <p:txBody>
+          <a:bodyPr vert="horz" lIns="91440" tIns="45720" rIns="91440" bIns="45720" rtlCol="0" anchor="ctr">
+            <a:normAutofit/>
+          </a:bodyPr>
+          <a:lstStyle>
+            <a:lvl1pPr algn="l" defTabSz="1639153" rtl="0" eaLnBrk="1" latinLnBrk="0" hangingPunct="1">
+              <a:lnSpc>
+                <a:spcPct val="90000"/>
+              </a:lnSpc>
+              <a:spcBef>
+                <a:spcPct val="0"/>
+              </a:spcBef>
+              <a:buNone/>
+              <a:defRPr sz="7887" kern="1200">
+                <a:solidFill>
+                  <a:schemeClr val="tx1"/>
+                </a:solidFill>
+                <a:latin typeface="+mj-lt"/>
+                <a:ea typeface="+mj-ea"/>
+                <a:cs typeface="+mj-cs"/>
+              </a:defRPr>
+            </a:lvl1pPr>
+          </a:lstStyle>
+          <a:p>
+            <a:pPr marL="0" marR="0" lvl="0" indent="0" algn="l" defTabSz="1639153" rtl="0" eaLnBrk="1" fontAlgn="auto" latinLnBrk="0" hangingPunct="1">
+              <a:lnSpc>
+                <a:spcPct val="90000"/>
+              </a:lnSpc>
+              <a:spcBef>
+                <a:spcPct val="0"/>
+              </a:spcBef>
+              <a:spcAft>
+                <a:spcPts val="0"/>
+              </a:spcAft>
+              <a:buClrTx/>
+              <a:buSzTx/>
+              <a:buFontTx/>
+              <a:buNone/>
+              <a:tabLst/>
+              <a:defRPr/>
+            </a:pPr>
+            <a:endParaRPr kumimoji="0" lang="tr-TR" sz="5400" b="1" i="0" u="none" strike="noStrike" kern="1200" cap="none" spc="0" normalizeH="0" baseline="0" noProof="0" dirty="0">
+              <a:ln>
+                <a:noFill/>
+              </a:ln>
+              <a:solidFill>
+                <a:prstClr val="white"/>
+              </a:solidFill>
+              <a:effectLst/>
+              <a:uLnTx/>
+              <a:uFillTx/>
+              <a:latin typeface="Times New Roman" panose="02020603050405020304" pitchFamily="18" charset="0"/>
+              <a:ea typeface="Calibri" charset="0"/>
+              <a:cs typeface="Times New Roman" panose="02020603050405020304" pitchFamily="18" charset="0"/>
+            </a:endParaRPr>
+          </a:p>
+        </p:txBody>
+      </p:sp>
+      <p:sp>
+        <p:nvSpPr>
+          <p:cNvPr id="5" name="Başlık 3">
+            <a:extLst>
+              <a:ext uri="{FF2B5EF4-FFF2-40B4-BE49-F238E27FC236}">
+                <a16:creationId xmlns:a16="http://schemas.microsoft.com/office/drawing/2014/main" id="{5DC561D1-AD06-B891-5B28-3FA522F184B6}"/>
+              </a:ext>
+            </a:extLst>
+          </p:cNvPr>
+          <p:cNvSpPr txBox="1">
+            <a:spLocks/>
+          </p:cNvSpPr>
+          <p:nvPr/>
+        </p:nvSpPr>
+        <p:spPr>
+          <a:xfrm>
+            <a:off x="1654939" y="407581"/>
+            <a:ext cx="16171174" cy="1913862"/>
+          </a:xfrm>
+          <a:prstGeom prst="rect">
+            <a:avLst/>
+          </a:prstGeom>
+        </p:spPr>
+        <p:txBody>
+          <a:bodyPr vert="horz" lIns="91440" tIns="45720" rIns="91440" bIns="45720" rtlCol="0" anchor="ctr">
+            <a:normAutofit/>
+          </a:bodyPr>
+          <a:lstStyle>
+            <a:lvl1pPr algn="l" defTabSz="1639153" rtl="0" eaLnBrk="1" latinLnBrk="0" hangingPunct="1">
+              <a:lnSpc>
+                <a:spcPct val="90000"/>
+              </a:lnSpc>
+              <a:spcBef>
+                <a:spcPct val="0"/>
+              </a:spcBef>
+              <a:buNone/>
+              <a:defRPr sz="7887" kern="1200">
+                <a:solidFill>
+                  <a:schemeClr val="tx1"/>
+                </a:solidFill>
+                <a:latin typeface="+mj-lt"/>
+                <a:ea typeface="+mj-ea"/>
+                <a:cs typeface="+mj-cs"/>
+              </a:defRPr>
+            </a:lvl1pPr>
+          </a:lstStyle>
+          <a:p>
+            <a:pPr marL="0" marR="0" lvl="0" indent="0" algn="l" defTabSz="1639153" rtl="0" eaLnBrk="1" fontAlgn="auto" latinLnBrk="0" hangingPunct="1">
+              <a:lnSpc>
+                <a:spcPct val="90000"/>
+              </a:lnSpc>
+              <a:spcBef>
+                <a:spcPct val="0"/>
+              </a:spcBef>
+              <a:spcAft>
+                <a:spcPts val="0"/>
+              </a:spcAft>
+              <a:buClrTx/>
+              <a:buSzTx/>
+              <a:buFontTx/>
+              <a:buNone/>
+              <a:tabLst/>
+              <a:defRPr/>
+            </a:pPr>
+            <a:r>
+              <a:rPr lang="tr-TR" sz="5400" b="1" dirty="0" err="1">
+                <a:solidFill>
+                  <a:prstClr val="white"/>
+                </a:solidFill>
+                <a:latin typeface="Times New Roman" panose="02020603050405020304" pitchFamily="18" charset="0"/>
+                <a:ea typeface="Calibri" charset="0"/>
+                <a:cs typeface="Times New Roman" panose="02020603050405020304" pitchFamily="18" charset="0"/>
+              </a:rPr>
+              <a:t>Custom</a:t>
+            </a:r>
+            <a:r>
+              <a:rPr lang="tr-TR" sz="5400" b="1" dirty="0">
+                <a:solidFill>
+                  <a:prstClr val="white"/>
+                </a:solidFill>
+                <a:latin typeface="Times New Roman" panose="02020603050405020304" pitchFamily="18" charset="0"/>
+                <a:ea typeface="Calibri" charset="0"/>
+                <a:cs typeface="Times New Roman" panose="02020603050405020304" pitchFamily="18" charset="0"/>
+              </a:rPr>
+              <a:t> </a:t>
+            </a:r>
+            <a:r>
+              <a:rPr lang="tr-TR" sz="5400" b="1" dirty="0" err="1">
+                <a:solidFill>
+                  <a:prstClr val="white"/>
+                </a:solidFill>
+                <a:latin typeface="Times New Roman" panose="02020603050405020304" pitchFamily="18" charset="0"/>
+                <a:ea typeface="Calibri" charset="0"/>
+                <a:cs typeface="Times New Roman" panose="02020603050405020304" pitchFamily="18" charset="0"/>
+              </a:rPr>
+              <a:t>Matlab</a:t>
+            </a:r>
+            <a:r>
+              <a:rPr lang="tr-TR" sz="5400" b="1" dirty="0">
+                <a:solidFill>
+                  <a:prstClr val="white"/>
+                </a:solidFill>
+                <a:latin typeface="Times New Roman" panose="02020603050405020304" pitchFamily="18" charset="0"/>
+                <a:ea typeface="Calibri" charset="0"/>
+                <a:cs typeface="Times New Roman" panose="02020603050405020304" pitchFamily="18" charset="0"/>
+              </a:rPr>
+              <a:t> </a:t>
+            </a:r>
+            <a:r>
+              <a:rPr lang="tr-TR" sz="5400" b="1" dirty="0" err="1">
+                <a:solidFill>
+                  <a:prstClr val="white"/>
+                </a:solidFill>
+                <a:latin typeface="Times New Roman" panose="02020603050405020304" pitchFamily="18" charset="0"/>
+                <a:ea typeface="Calibri" charset="0"/>
+                <a:cs typeface="Times New Roman" panose="02020603050405020304" pitchFamily="18" charset="0"/>
+              </a:rPr>
+              <a:t>Hybrid</a:t>
+            </a:r>
+            <a:r>
+              <a:rPr lang="tr-TR" sz="5400" b="1" dirty="0">
+                <a:solidFill>
+                  <a:prstClr val="white"/>
+                </a:solidFill>
+                <a:latin typeface="Times New Roman" panose="02020603050405020304" pitchFamily="18" charset="0"/>
+                <a:ea typeface="Calibri" charset="0"/>
+                <a:cs typeface="Times New Roman" panose="02020603050405020304" pitchFamily="18" charset="0"/>
+              </a:rPr>
+              <a:t> A* </a:t>
+            </a:r>
+            <a:r>
+              <a:rPr lang="tr-TR" sz="5400" b="1" dirty="0" err="1">
+                <a:solidFill>
+                  <a:prstClr val="white"/>
+                </a:solidFill>
+                <a:latin typeface="Times New Roman" panose="02020603050405020304" pitchFamily="18" charset="0"/>
+                <a:ea typeface="Calibri" charset="0"/>
+                <a:cs typeface="Times New Roman" panose="02020603050405020304" pitchFamily="18" charset="0"/>
+              </a:rPr>
+              <a:t>Code</a:t>
+            </a:r>
+            <a:r>
+              <a:rPr lang="tr-TR" sz="5400" b="1" dirty="0">
+                <a:solidFill>
+                  <a:prstClr val="white"/>
+                </a:solidFill>
+                <a:latin typeface="Times New Roman" panose="02020603050405020304" pitchFamily="18" charset="0"/>
+                <a:ea typeface="Calibri" charset="0"/>
+                <a:cs typeface="Times New Roman" panose="02020603050405020304" pitchFamily="18" charset="0"/>
+              </a:rPr>
+              <a:t> </a:t>
+            </a:r>
+            <a:endParaRPr kumimoji="0" lang="tr-TR" sz="5400" b="1" i="0" u="none" strike="noStrike" kern="1200" cap="none" spc="0" normalizeH="0" baseline="0" noProof="0" dirty="0">
+              <a:ln>
+                <a:noFill/>
+              </a:ln>
+              <a:solidFill>
+                <a:prstClr val="white"/>
+              </a:solidFill>
+              <a:effectLst/>
+              <a:uLnTx/>
+              <a:uFillTx/>
+              <a:latin typeface="Times New Roman" panose="02020603050405020304" pitchFamily="18" charset="0"/>
+              <a:ea typeface="Calibri" charset="0"/>
+              <a:cs typeface="Times New Roman" panose="02020603050405020304" pitchFamily="18" charset="0"/>
+            </a:endParaRPr>
+          </a:p>
+        </p:txBody>
+      </p:sp>
+      <p:sp>
+        <p:nvSpPr>
+          <p:cNvPr id="7" name="TextBox 7">
+            <a:extLst>
+              <a:ext uri="{FF2B5EF4-FFF2-40B4-BE49-F238E27FC236}">
+                <a16:creationId xmlns:a16="http://schemas.microsoft.com/office/drawing/2014/main" id="{6BF87109-6B24-4194-8BA8-05073DA4ED0B}"/>
+              </a:ext>
+            </a:extLst>
+          </p:cNvPr>
+          <p:cNvSpPr txBox="1"/>
+          <p:nvPr/>
+        </p:nvSpPr>
+        <p:spPr>
+          <a:xfrm>
+            <a:off x="1502539" y="2784894"/>
+            <a:ext cx="19273828" cy="922688"/>
+          </a:xfrm>
+          <a:prstGeom prst="rect">
+            <a:avLst/>
+          </a:prstGeom>
+          <a:noFill/>
+        </p:spPr>
+        <p:txBody>
+          <a:bodyPr wrap="square" rtlCol="0">
+            <a:spAutoFit/>
+          </a:bodyPr>
+          <a:lstStyle/>
+          <a:p>
+            <a:pPr marL="457200" indent="-457200">
+              <a:buFont typeface="Arial" panose="020B0604020202020204" pitchFamily="34" charset="0"/>
+              <a:buChar char="•"/>
+            </a:pPr>
+            <a:r>
+              <a:rPr lang="tr-TR" dirty="0"/>
+              <a:t>Önceki slaytta yazılan A* kodu, «</a:t>
+            </a:r>
+            <a:r>
+              <a:rPr lang="en-US" i="1" dirty="0"/>
+              <a:t>A Hybrid A* Path Planning Algorithm Based on</a:t>
+            </a:r>
+            <a:r>
+              <a:rPr lang="tr-TR" i="1" dirty="0"/>
+              <a:t> </a:t>
+            </a:r>
+            <a:r>
+              <a:rPr lang="en-US" i="1" dirty="0"/>
+              <a:t>Multi-objective Constraints</a:t>
+            </a:r>
+            <a:r>
+              <a:rPr lang="tr-TR" dirty="0"/>
+              <a:t>» adlı makaledeki gibi </a:t>
+            </a:r>
+            <a:r>
+              <a:rPr lang="tr-TR" dirty="0" err="1"/>
+              <a:t>hybrid</a:t>
+            </a:r>
+            <a:r>
+              <a:rPr lang="tr-TR" dirty="0"/>
+              <a:t> bir forma getirilmiştir.</a:t>
+            </a:r>
+            <a:endParaRPr lang="en-US" i="1" dirty="0"/>
+          </a:p>
+        </p:txBody>
+      </p:sp>
+      <p:pic>
+        <p:nvPicPr>
+          <p:cNvPr id="13" name="Resim 12">
+            <a:extLst>
+              <a:ext uri="{FF2B5EF4-FFF2-40B4-BE49-F238E27FC236}">
+                <a16:creationId xmlns:a16="http://schemas.microsoft.com/office/drawing/2014/main" id="{0AA294BA-8DFB-436E-992C-5BEE4A857857}"/>
+              </a:ext>
+            </a:extLst>
+          </p:cNvPr>
+          <p:cNvPicPr>
+            <a:picLocks noChangeAspect="1"/>
+          </p:cNvPicPr>
+          <p:nvPr/>
+        </p:nvPicPr>
+        <p:blipFill>
+          <a:blip r:embed="rId2"/>
+          <a:stretch>
+            <a:fillRect/>
+          </a:stretch>
+        </p:blipFill>
+        <p:spPr>
+          <a:xfrm>
+            <a:off x="1654939" y="4323433"/>
+            <a:ext cx="7566748" cy="5395422"/>
+          </a:xfrm>
+          <a:prstGeom prst="rect">
+            <a:avLst/>
+          </a:prstGeom>
+        </p:spPr>
+      </p:pic>
+    </p:spTree>
+    <p:extLst>
+      <p:ext uri="{BB962C8B-B14F-4D97-AF65-F5344CB8AC3E}">
+        <p14:creationId xmlns:p14="http://schemas.microsoft.com/office/powerpoint/2010/main" val="2439750117"/>
+      </p:ext>
+    </p:extLst>
+  </p:cSld>
+  <p:clrMapOvr>
+    <a:masterClrMapping/>
+  </p:clrMapOvr>
 </p:sld>
 </file>
 

</xml_diff>

<commit_message>
Create Hybrid A Star Without Occupancy Check
</commit_message>
<xml_diff>
--- a/Presentation_Sources.pptx
+++ b/Presentation_Sources.pptx
@@ -5348,7 +5348,7 @@
           <a:p>
             <a:fld id="{7808C551-22FF-4CB8-B8F2-5188D8B377D2}" type="datetimeFigureOut">
               <a:rPr lang="tr-TR" smtClean="0"/>
-              <a:t>11.03.2024</a:t>
+              <a:t>12.03.2024</a:t>
             </a:fld>
             <a:endParaRPr lang="tr-TR"/>
           </a:p>
@@ -5754,7 +5754,7 @@
                 <a:latin typeface="Calibri"/>
               </a:rPr>
               <a:pPr/>
-              <a:t>11.03.2024</a:t>
+              <a:t>12.03.2024</a:t>
             </a:fld>
             <a:endParaRPr lang="tr-TR">
               <a:solidFill>
@@ -5961,7 +5961,7 @@
                 <a:latin typeface="Calibri"/>
               </a:rPr>
               <a:pPr/>
-              <a:t>11.03.2024</a:t>
+              <a:t>12.03.2024</a:t>
             </a:fld>
             <a:endParaRPr lang="tr-TR">
               <a:solidFill>
@@ -6178,7 +6178,7 @@
                 <a:latin typeface="Calibri"/>
               </a:rPr>
               <a:pPr/>
-              <a:t>11.03.2024</a:t>
+              <a:t>12.03.2024</a:t>
             </a:fld>
             <a:endParaRPr lang="tr-TR">
               <a:solidFill>
@@ -6385,7 +6385,7 @@
                 <a:latin typeface="Calibri"/>
               </a:rPr>
               <a:pPr/>
-              <a:t>11.03.2024</a:t>
+              <a:t>12.03.2024</a:t>
             </a:fld>
             <a:endParaRPr lang="tr-TR">
               <a:solidFill>
@@ -6668,7 +6668,7 @@
                 <a:latin typeface="Calibri"/>
               </a:rPr>
               <a:pPr/>
-              <a:t>11.03.2024</a:t>
+              <a:t>12.03.2024</a:t>
             </a:fld>
             <a:endParaRPr lang="tr-TR">
               <a:solidFill>
@@ -6937,7 +6937,7 @@
                 <a:latin typeface="Calibri"/>
               </a:rPr>
               <a:pPr/>
-              <a:t>11.03.2024</a:t>
+              <a:t>12.03.2024</a:t>
             </a:fld>
             <a:endParaRPr lang="tr-TR">
               <a:solidFill>
@@ -7341,7 +7341,7 @@
                 <a:latin typeface="Calibri"/>
               </a:rPr>
               <a:pPr/>
-              <a:t>11.03.2024</a:t>
+              <a:t>12.03.2024</a:t>
             </a:fld>
             <a:endParaRPr lang="tr-TR">
               <a:solidFill>
@@ -7496,7 +7496,7 @@
                 <a:latin typeface="Calibri"/>
               </a:rPr>
               <a:pPr/>
-              <a:t>11.03.2024</a:t>
+              <a:t>12.03.2024</a:t>
             </a:fld>
             <a:endParaRPr lang="tr-TR">
               <a:solidFill>
@@ -7628,7 +7628,7 @@
                 <a:latin typeface="Calibri"/>
               </a:rPr>
               <a:pPr/>
-              <a:t>11.03.2024</a:t>
+              <a:t>12.03.2024</a:t>
             </a:fld>
             <a:endParaRPr lang="tr-TR">
               <a:solidFill>
@@ -7942,7 +7942,7 @@
                 <a:latin typeface="Calibri"/>
               </a:rPr>
               <a:pPr/>
-              <a:t>11.03.2024</a:t>
+              <a:t>12.03.2024</a:t>
             </a:fld>
             <a:endParaRPr lang="tr-TR">
               <a:solidFill>
@@ -8236,7 +8236,7 @@
                 <a:latin typeface="Calibri"/>
               </a:rPr>
               <a:pPr/>
-              <a:t>11.03.2024</a:t>
+              <a:t>12.03.2024</a:t>
             </a:fld>
             <a:endParaRPr lang="tr-TR">
               <a:solidFill>
@@ -8487,7 +8487,7 @@
           <a:p>
             <a:fld id="{E1F0B1EE-5644-334F-BFED-7CDB7C3E0DCD}" type="datetimeFigureOut">
               <a:rPr lang="tr-TR" smtClean="0"/>
-              <a:t>11.03.2024</a:t>
+              <a:t>12.03.2024</a:t>
             </a:fld>
             <a:endParaRPr lang="tr-TR"/>
           </a:p>
@@ -9861,7 +9861,7 @@
           <a:graphicData uri="http://schemas.openxmlformats.org/presentationml/2006/ole">
             <mc:AlternateContent xmlns:mc="http://schemas.openxmlformats.org/markup-compatibility/2006">
               <mc:Choice xmlns:v="urn:schemas-microsoft-com:vml" Requires="v">
-                <p:oleObj spid="_x0000_s1029" name="Paketleyici Kabuk Nesnesi" showAsIcon="1" r:id="rId6" imgW="1221480" imgH="385200" progId="Package">
+                <p:oleObj spid="_x0000_s1031" name="Paketleyici Kabuk Nesnesi" showAsIcon="1" r:id="rId6" imgW="1221480" imgH="385200" progId="Package">
                   <p:embed/>
                 </p:oleObj>
               </mc:Choice>
@@ -10445,7 +10445,7 @@
         <p:spPr>
           <a:xfrm>
             <a:off x="1654939" y="4323433"/>
-            <a:ext cx="7566748" cy="5395422"/>
+            <a:ext cx="7968746" cy="5682064"/>
           </a:xfrm>
           <a:prstGeom prst="rect">
             <a:avLst/>

</xml_diff>